<commit_message>
cut 2 of materials
</commit_message>
<xml_diff>
--- a/sessions/session1/Session1.pptx
+++ b/sessions/session1/Session1.pptx
@@ -2749,8 +2749,9 @@
           <a:p>
             <a:r>
               <a:rPr lang="en-US" dirty="0" smtClean="0"/>
-              <a:t>Programming Background</a:t>
-            </a:r>
+              <a:t>Background</a:t>
+            </a:r>
+            <a:endParaRPr lang="en-US" dirty="0" smtClean="0"/>
           </a:p>
           <a:p>
             <a:endParaRPr lang="en-US" dirty="0"/>
@@ -2841,7 +2842,7 @@
         </p:spPr>
         <p:txBody>
           <a:bodyPr>
-            <a:normAutofit fontScale="92500" lnSpcReduction="20000"/>
+            <a:normAutofit fontScale="55000" lnSpcReduction="20000"/>
           </a:bodyPr>
           <a:lstStyle/>
           <a:p>
@@ -2894,12 +2895,13 @@
             </a:pPr>
             <a:r>
               <a:rPr sz="3168" dirty="0"/>
-              <a:t>Learn to </a:t>
-            </a:r>
-            <a:r>
-              <a:rPr lang="en-US" sz="3168" dirty="0" smtClean="0"/>
-              <a:t>Work with </a:t>
-            </a:r>
+              <a:t>Learn </a:t>
+            </a:r>
+            <a:r>
+              <a:rPr sz="3168" dirty="0" smtClean="0"/>
+              <a:t>to</a:t>
+            </a:r>
+            <a:endParaRPr lang="en-US" sz="3168" dirty="0" smtClean="0"/>
           </a:p>
           <a:p>
             <a:pPr marL="835659" lvl="1" indent="-391159" defTabSz="514095">
@@ -2910,24 +2912,13 @@
             </a:pPr>
             <a:r>
               <a:rPr lang="en-US" sz="3168" dirty="0" smtClean="0"/>
-              <a:t>R </a:t>
-            </a:r>
-            <a:r>
-              <a:rPr lang="en-US" sz="3168" dirty="0" smtClean="0"/>
-              <a:t>data </a:t>
-            </a:r>
-            <a:r>
-              <a:rPr lang="en-US" sz="3168" dirty="0" smtClean="0"/>
-              <a:t>structures – vectors, matrices, </a:t>
+              <a:t>Setup </a:t>
             </a:r>
             <a:r>
               <a:rPr lang="en-US" sz="3168" dirty="0" err="1" smtClean="0"/>
-              <a:t>dataframes</a:t>
-            </a:r>
-            <a:r>
-              <a:rPr lang="en-US" sz="3168" dirty="0" smtClean="0"/>
-              <a:t>, lists</a:t>
-            </a:r>
+              <a:t>RStudio</a:t>
+            </a:r>
+            <a:endParaRPr lang="en-US" sz="3168" dirty="0" smtClean="0"/>
           </a:p>
           <a:p>
             <a:pPr marL="835659" lvl="1" indent="-391159" defTabSz="514095">
@@ -2938,7 +2929,7 @@
             </a:pPr>
             <a:r>
               <a:rPr lang="en-US" sz="3168" dirty="0" smtClean="0"/>
-              <a:t>R control structures – loops, apply functions</a:t>
+              <a:t>Import data</a:t>
             </a:r>
           </a:p>
           <a:p>
@@ -2950,7 +2941,19 @@
             </a:pPr>
             <a:r>
               <a:rPr lang="en-US" sz="3168" dirty="0" smtClean="0"/>
-              <a:t>R graphics</a:t>
+              <a:t>R </a:t>
+            </a:r>
+            <a:r>
+              <a:rPr lang="en-US" sz="3168" dirty="0" smtClean="0"/>
+              <a:t>data structures – vectors, matrices, </a:t>
+            </a:r>
+            <a:r>
+              <a:rPr lang="en-US" sz="3168" dirty="0" err="1" smtClean="0"/>
+              <a:t>dataframes</a:t>
+            </a:r>
+            <a:r>
+              <a:rPr lang="en-US" sz="3168" dirty="0" smtClean="0"/>
+              <a:t>, lists</a:t>
             </a:r>
           </a:p>
           <a:p>
@@ -2962,7 +2965,35 @@
             </a:pPr>
             <a:r>
               <a:rPr lang="en-US" sz="3168" dirty="0" smtClean="0"/>
-              <a:t>R packages</a:t>
+              <a:t>R control structures – loops, apply functions</a:t>
+            </a:r>
+          </a:p>
+          <a:p>
+            <a:pPr marL="835659" lvl="1" indent="-391159" defTabSz="514095">
+              <a:spcBef>
+                <a:spcPts val="3600"/>
+              </a:spcBef>
+              <a:defRPr sz="1800"/>
+            </a:pPr>
+            <a:r>
+              <a:rPr lang="en-US" sz="3168" dirty="0" smtClean="0"/>
+              <a:t>R graphics</a:t>
+            </a:r>
+          </a:p>
+          <a:p>
+            <a:pPr marL="835659" lvl="1" indent="-391159" defTabSz="514095">
+              <a:spcBef>
+                <a:spcPts val="3600"/>
+              </a:spcBef>
+              <a:defRPr sz="1800"/>
+            </a:pPr>
+            <a:r>
+              <a:rPr lang="en-US" sz="3168" smtClean="0"/>
+              <a:t>Working with R </a:t>
+            </a:r>
+            <a:r>
+              <a:rPr lang="en-US" sz="3168" dirty="0" smtClean="0"/>
+              <a:t>packages</a:t>
             </a:r>
             <a:endParaRPr sz="3168" dirty="0"/>
           </a:p>
@@ -3053,13 +3084,7 @@
               <a:rPr lang="en-US" dirty="0" smtClean="0">
                 <a:hlinkClick r:id="rId2"/>
               </a:rPr>
-              <a:t>http://</a:t>
-            </a:r>
-            <a:r>
-              <a:rPr lang="en-US" dirty="0" smtClean="0">
-                <a:hlinkClick r:id="rId2"/>
-              </a:rPr>
-              <a:t>stackoverflow.com/</a:t>
+              <a:t>http://stackoverflow.com/</a:t>
             </a:r>
             <a:endParaRPr lang="en-US" dirty="0" smtClean="0"/>
           </a:p>
@@ -4933,11 +4958,7 @@
             </a:pPr>
             <a:r>
               <a:rPr lang="en-US" sz="8000" dirty="0" smtClean="0"/>
-              <a:t>Setup </a:t>
-            </a:r>
-            <a:r>
-              <a:rPr lang="en-US" sz="8000" dirty="0" smtClean="0"/>
-              <a:t>RStudio</a:t>
+              <a:t>Setup RStudio</a:t>
             </a:r>
             <a:endParaRPr sz="8000" dirty="0"/>
           </a:p>
@@ -5094,7 +5115,6 @@
               <a:rPr lang="en-US" dirty="0" smtClean="0"/>
               <a:t>Installing</a:t>
             </a:r>
-            <a:endParaRPr lang="en-US" dirty="0" smtClean="0"/>
           </a:p>
           <a:p>
             <a:pPr marL="0" indent="0">
@@ -5143,7 +5163,6 @@
               <a:rPr lang="en-US" b="1" dirty="0" smtClean="0"/>
               <a:t>)</a:t>
             </a:r>
-            <a:endParaRPr lang="en-US" b="1" dirty="0" smtClean="0"/>
           </a:p>
         </p:txBody>
       </p:sp>

</xml_diff>

<commit_message>
updated materials autumn workshop
</commit_message>
<xml_diff>
--- a/sessions/session1/Session1.pptx
+++ b/sessions/session1/Session1.pptx
@@ -5,22 +5,21 @@
     <p:sldMasterId id="2147483648" r:id="rId1"/>
   </p:sldMasterIdLst>
   <p:notesMasterIdLst>
-    <p:notesMasterId r:id="rId15"/>
+    <p:notesMasterId r:id="rId14"/>
   </p:notesMasterIdLst>
   <p:sldIdLst>
     <p:sldId id="256" r:id="rId2"/>
-    <p:sldId id="314" r:id="rId3"/>
-    <p:sldId id="257" r:id="rId4"/>
-    <p:sldId id="310" r:id="rId5"/>
-    <p:sldId id="259" r:id="rId6"/>
-    <p:sldId id="305" r:id="rId7"/>
-    <p:sldId id="261" r:id="rId8"/>
-    <p:sldId id="308" r:id="rId9"/>
-    <p:sldId id="312" r:id="rId10"/>
-    <p:sldId id="269" r:id="rId11"/>
-    <p:sldId id="270" r:id="rId12"/>
-    <p:sldId id="273" r:id="rId13"/>
-    <p:sldId id="315" r:id="rId14"/>
+    <p:sldId id="257" r:id="rId3"/>
+    <p:sldId id="310" r:id="rId4"/>
+    <p:sldId id="259" r:id="rId5"/>
+    <p:sldId id="305" r:id="rId6"/>
+    <p:sldId id="261" r:id="rId7"/>
+    <p:sldId id="308" r:id="rId8"/>
+    <p:sldId id="312" r:id="rId9"/>
+    <p:sldId id="269" r:id="rId10"/>
+    <p:sldId id="270" r:id="rId11"/>
+    <p:sldId id="273" r:id="rId12"/>
+    <p:sldId id="315" r:id="rId13"/>
   </p:sldIdLst>
   <p:sldSz cx="13004800" cy="9753600"/>
   <p:notesSz cx="6858000" cy="9144000"/>
@@ -2144,7 +2143,7 @@
             </a:br>
             <a:r>
               <a:rPr lang="en-US" sz="6800" dirty="0" smtClean="0"/>
-              <a:t>Feb 20</a:t>
+              <a:t>Aug 20</a:t>
             </a:r>
             <a:r>
               <a:rPr lang="en-US" sz="6800" baseline="30000" dirty="0" smtClean="0"/>
@@ -2271,7 +2270,11 @@
           <a:p>
             <a:r>
               <a:rPr lang="en-US" dirty="0" smtClean="0"/>
-              <a:t>Installing Packages From CRAN</a:t>
+              <a:t>Installing Packages From </a:t>
+            </a:r>
+            <a:r>
+              <a:rPr lang="en-US" dirty="0" err="1" smtClean="0"/>
+              <a:t>Github</a:t>
             </a:r>
             <a:endParaRPr lang="en-US" dirty="0"/>
           </a:p>
@@ -2289,37 +2292,61 @@
         </p:nvSpPr>
         <p:spPr/>
         <p:txBody>
-          <a:bodyPr>
-            <a:normAutofit/>
-          </a:bodyPr>
+          <a:bodyPr/>
           <a:lstStyle/>
           <a:p>
+            <a:pPr marL="0" indent="0">
+              <a:buNone/>
+            </a:pPr>
+            <a:r>
+              <a:rPr lang="en-US" dirty="0" smtClean="0"/>
+              <a:t>&gt; library(</a:t>
+            </a:r>
             <a:r>
               <a:rPr lang="en-US" b="1" dirty="0" err="1" smtClean="0"/>
               <a:t>devtools</a:t>
             </a:r>
-            <a:endParaRPr lang="en-US" b="1" dirty="0" smtClean="0"/>
-          </a:p>
-          <a:p>
+            <a:r>
+              <a:rPr lang="en-US" dirty="0" smtClean="0"/>
+              <a:t>)</a:t>
+            </a:r>
+          </a:p>
+          <a:p>
+            <a:pPr marL="0" indent="0">
+              <a:buNone/>
+            </a:pPr>
+            <a:r>
+              <a:rPr lang="en-US" dirty="0" smtClean="0"/>
+              <a:t>&gt; </a:t>
+            </a:r>
+            <a:r>
+              <a:rPr lang="en-US" dirty="0" err="1" smtClean="0"/>
+              <a:t>install_github</a:t>
+            </a:r>
+            <a:r>
+              <a:rPr lang="en-US" dirty="0" smtClean="0"/>
+              <a:t>(“</a:t>
+            </a:r>
             <a:r>
               <a:rPr lang="en-US" b="1" dirty="0" err="1" smtClean="0"/>
-              <a:t>rmarkdown</a:t>
-            </a:r>
-            <a:endParaRPr lang="en-US" b="1" dirty="0" smtClean="0"/>
-          </a:p>
-          <a:p>
-            <a:r>
-              <a:rPr lang="en-US" b="1" dirty="0" err="1" smtClean="0"/>
-              <a:t>knitr</a:t>
-            </a:r>
-            <a:endParaRPr lang="en-US" b="1" dirty="0" smtClean="0"/>
+              <a:t>dgrtwo</a:t>
+            </a:r>
+            <a:r>
+              <a:rPr lang="en-US" b="1" dirty="0" smtClean="0"/>
+              <a:t>/broom</a:t>
+            </a:r>
+            <a:r>
+              <a:rPr lang="en-US" dirty="0" smtClean="0"/>
+              <a:t>”)</a:t>
+            </a:r>
+            <a:endParaRPr lang="en-US" dirty="0"/>
           </a:p>
         </p:txBody>
       </p:sp>
     </p:spTree>
     <p:extLst>
       <p:ext uri="{BB962C8B-B14F-4D97-AF65-F5344CB8AC3E}">
-        <p14:creationId xmlns:p14="http://schemas.microsoft.com/office/powerpoint/2010/main" val="2321929056"/>
+        <p14:creationId xmlns:p14="http://schemas.microsoft.com/office/powerpoint/2010/main" val="916127823"/>
       </p:ext>
     </p:extLst>
   </p:cSld>
@@ -2366,18 +2393,12 @@
         </p:nvSpPr>
         <p:spPr/>
         <p:txBody>
-          <a:bodyPr>
-            <a:normAutofit fontScale="90000"/>
-          </a:bodyPr>
+          <a:bodyPr/>
           <a:lstStyle/>
           <a:p>
             <a:r>
               <a:rPr lang="en-US" dirty="0" smtClean="0"/>
-              <a:t>Installing Packages From </a:t>
-            </a:r>
-            <a:r>
-              <a:rPr lang="en-US" dirty="0" err="1" smtClean="0"/>
-              <a:t>Github</a:t>
+              <a:t>Finding Help in R</a:t>
             </a:r>
             <a:endParaRPr lang="en-US" dirty="0"/>
           </a:p>
@@ -2395,61 +2416,35 @@
         </p:nvSpPr>
         <p:spPr/>
         <p:txBody>
-          <a:bodyPr/>
+          <a:bodyPr>
+            <a:normAutofit/>
+          </a:bodyPr>
           <a:lstStyle/>
           <a:p>
-            <a:pPr marL="0" indent="0">
-              <a:buNone/>
-            </a:pPr>
             <a:r>
               <a:rPr lang="en-US" dirty="0" smtClean="0"/>
-              <a:t>&gt; library(</a:t>
-            </a:r>
-            <a:r>
-              <a:rPr lang="en-US" b="1" dirty="0" err="1" smtClean="0"/>
-              <a:t>devtools</a:t>
+              <a:t>? – Exact match</a:t>
+            </a:r>
+          </a:p>
+          <a:p>
+            <a:endParaRPr lang="en-US" dirty="0" smtClean="0"/>
+          </a:p>
+          <a:p>
+            <a:r>
+              <a:rPr lang="en-US" dirty="0"/>
+              <a:t>?? – Fuzzy </a:t>
             </a:r>
             <a:r>
               <a:rPr lang="en-US" dirty="0" smtClean="0"/>
-              <a:t>)</a:t>
-            </a:r>
-          </a:p>
-          <a:p>
-            <a:pPr marL="0" indent="0">
-              <a:buNone/>
-            </a:pPr>
-            <a:r>
-              <a:rPr lang="en-US" dirty="0" smtClean="0"/>
-              <a:t>&gt; </a:t>
-            </a:r>
-            <a:r>
-              <a:rPr lang="en-US" dirty="0" err="1" smtClean="0"/>
-              <a:t>install_github</a:t>
-            </a:r>
-            <a:r>
-              <a:rPr lang="en-US" dirty="0" smtClean="0"/>
-              <a:t>(“</a:t>
-            </a:r>
-            <a:r>
-              <a:rPr lang="en-US" b="1" dirty="0" err="1" smtClean="0"/>
-              <a:t>dgrtwo</a:t>
-            </a:r>
-            <a:r>
-              <a:rPr lang="en-US" b="1" dirty="0" smtClean="0"/>
-              <a:t>/broom</a:t>
-            </a:r>
-            <a:r>
-              <a:rPr lang="en-US" dirty="0" smtClean="0"/>
-              <a:t>”)</a:t>
-            </a:r>
-            <a:endParaRPr lang="en-US" dirty="0"/>
+              <a:t>match</a:t>
+            </a:r>
           </a:p>
         </p:txBody>
       </p:sp>
     </p:spTree>
     <p:extLst>
       <p:ext uri="{BB962C8B-B14F-4D97-AF65-F5344CB8AC3E}">
-        <p14:creationId xmlns:p14="http://schemas.microsoft.com/office/powerpoint/2010/main" val="916127823"/>
+        <p14:creationId xmlns:p14="http://schemas.microsoft.com/office/powerpoint/2010/main" val="4229319926"/>
       </p:ext>
     </p:extLst>
   </p:cSld>
@@ -2501,104 +2496,6 @@
           <a:p>
             <a:r>
               <a:rPr lang="en-US" dirty="0" smtClean="0"/>
-              <a:t>Finding Help in R</a:t>
-            </a:r>
-            <a:endParaRPr lang="en-US" dirty="0"/>
-          </a:p>
-        </p:txBody>
-      </p:sp>
-      <p:sp>
-        <p:nvSpPr>
-          <p:cNvPr id="3" name="Text Placeholder 2"/>
-          <p:cNvSpPr>
-            <a:spLocks noGrp="1"/>
-          </p:cNvSpPr>
-          <p:nvPr>
-            <p:ph type="body" idx="1"/>
-          </p:nvPr>
-        </p:nvSpPr>
-        <p:spPr/>
-        <p:txBody>
-          <a:bodyPr>
-            <a:normAutofit/>
-          </a:bodyPr>
-          <a:lstStyle/>
-          <a:p>
-            <a:r>
-              <a:rPr lang="en-US" dirty="0" smtClean="0"/>
-              <a:t>? – Exact match</a:t>
-            </a:r>
-          </a:p>
-          <a:p>
-            <a:endParaRPr lang="en-US" dirty="0" smtClean="0"/>
-          </a:p>
-          <a:p>
-            <a:r>
-              <a:rPr lang="en-US" dirty="0"/>
-              <a:t>?? – Fuzzy </a:t>
-            </a:r>
-            <a:r>
-              <a:rPr lang="en-US" dirty="0" smtClean="0"/>
-              <a:t>match</a:t>
-            </a:r>
-          </a:p>
-        </p:txBody>
-      </p:sp>
-    </p:spTree>
-    <p:extLst>
-      <p:ext uri="{BB962C8B-B14F-4D97-AF65-F5344CB8AC3E}">
-        <p14:creationId xmlns:p14="http://schemas.microsoft.com/office/powerpoint/2010/main" val="4229319926"/>
-      </p:ext>
-    </p:extLst>
-  </p:cSld>
-  <p:clrMapOvr>
-    <a:masterClrMapping/>
-  </p:clrMapOvr>
-  <p:transition spd="med"/>
-  <p:timing>
-    <p:tnLst>
-      <p:par>
-        <p:cTn id="1" dur="indefinite" restart="never" nodeType="tmRoot"/>
-      </p:par>
-    </p:tnLst>
-  </p:timing>
-</p:sld>
-</file>
-
-<file path=ppt/slides/slide13.xml><?xml version="1.0" encoding="utf-8"?>
-<p:sld xmlns:a="http://schemas.openxmlformats.org/drawingml/2006/main" xmlns:r="http://schemas.openxmlformats.org/officeDocument/2006/relationships" xmlns:p="http://schemas.openxmlformats.org/presentationml/2006/main">
-  <p:cSld>
-    <p:spTree>
-      <p:nvGrpSpPr>
-        <p:cNvPr id="1" name=""/>
-        <p:cNvGrpSpPr/>
-        <p:nvPr/>
-      </p:nvGrpSpPr>
-      <p:grpSpPr>
-        <a:xfrm>
-          <a:off x="0" y="0"/>
-          <a:ext cx="0" cy="0"/>
-          <a:chOff x="0" y="0"/>
-          <a:chExt cx="0" cy="0"/>
-        </a:xfrm>
-      </p:grpSpPr>
-      <p:sp>
-        <p:nvSpPr>
-          <p:cNvPr id="2" name="Title 1"/>
-          <p:cNvSpPr>
-            <a:spLocks noGrp="1"/>
-          </p:cNvSpPr>
-          <p:nvPr>
-            <p:ph type="title"/>
-          </p:nvPr>
-        </p:nvSpPr>
-        <p:spPr/>
-        <p:txBody>
-          <a:bodyPr/>
-          <a:lstStyle/>
-          <a:p>
-            <a:r>
-              <a:rPr lang="en-US" dirty="0" smtClean="0"/>
               <a:t>Recap</a:t>
             </a:r>
             <a:endParaRPr lang="en-US" dirty="0"/>
@@ -2705,7 +2602,7 @@
       </p:grpSpPr>
       <p:sp>
         <p:nvSpPr>
-          <p:cNvPr id="4" name="Title 3"/>
+          <p:cNvPr id="36" name="Shape 36"/>
           <p:cNvSpPr>
             <a:spLocks noGrp="1"/>
           </p:cNvSpPr>
@@ -2713,56 +2610,195 @@
             <p:ph type="title"/>
           </p:nvPr>
         </p:nvSpPr>
-        <p:spPr/>
+        <p:spPr>
+          <a:prstGeom prst="rect">
+            <a:avLst/>
+          </a:prstGeom>
+        </p:spPr>
         <p:txBody>
           <a:bodyPr/>
           <a:lstStyle/>
           <a:p>
-            <a:r>
-              <a:rPr lang="en-US" dirty="0" smtClean="0"/>
-              <a:t>Introductions</a:t>
-            </a:r>
-            <a:endParaRPr lang="en-US" dirty="0"/>
+            <a:pPr lvl="0">
+              <a:defRPr sz="1800"/>
+            </a:pPr>
+            <a:r>
+              <a:rPr sz="8000"/>
+              <a:t>Workshop Objectives</a:t>
+            </a:r>
           </a:p>
         </p:txBody>
       </p:sp>
       <p:sp>
         <p:nvSpPr>
-          <p:cNvPr id="2" name="Text Placeholder 1"/>
+          <p:cNvPr id="37" name="Shape 37"/>
           <p:cNvSpPr>
             <a:spLocks noGrp="1"/>
           </p:cNvSpPr>
           <p:nvPr>
-            <p:ph type="body" idx="1"/>
+            <p:ph type="body" idx="4294967295"/>
           </p:nvPr>
         </p:nvSpPr>
-        <p:spPr/>
+        <p:spPr>
+          <a:prstGeom prst="rect">
+            <a:avLst/>
+          </a:prstGeom>
+        </p:spPr>
         <p:txBody>
-          <a:bodyPr/>
+          <a:bodyPr>
+            <a:normAutofit fontScale="55000" lnSpcReduction="20000"/>
+          </a:bodyPr>
           <a:lstStyle/>
           <a:p>
-            <a:r>
-              <a:rPr lang="en-US" dirty="0" smtClean="0"/>
-              <a:t>Your Name</a:t>
-            </a:r>
-          </a:p>
-          <a:p>
-            <a:r>
-              <a:rPr lang="en-US" dirty="0" smtClean="0"/>
-              <a:t>Background</a:t>
-            </a:r>
-          </a:p>
-          <a:p>
-            <a:endParaRPr lang="en-US" dirty="0"/>
+            <a:pPr marL="391159" lvl="0" indent="-391159" defTabSz="514095">
+              <a:spcBef>
+                <a:spcPts val="3600"/>
+              </a:spcBef>
+              <a:defRPr sz="1800"/>
+            </a:pPr>
+            <a:r>
+              <a:rPr sz="3168" dirty="0"/>
+              <a:t>Get Comfortable with R</a:t>
+            </a:r>
+          </a:p>
+          <a:p>
+            <a:pPr marL="782319" lvl="1" indent="-391159" defTabSz="514095">
+              <a:spcBef>
+                <a:spcPts val="3600"/>
+              </a:spcBef>
+              <a:defRPr sz="1800"/>
+            </a:pPr>
+            <a:r>
+              <a:rPr sz="3168" dirty="0"/>
+              <a:t>For Your Classes</a:t>
+            </a:r>
+          </a:p>
+          <a:p>
+            <a:pPr marL="782319" lvl="1" indent="-391159" defTabSz="514095">
+              <a:spcBef>
+                <a:spcPts val="3600"/>
+              </a:spcBef>
+              <a:defRPr sz="1800"/>
+            </a:pPr>
+            <a:r>
+              <a:rPr sz="3168" dirty="0"/>
+              <a:t>Individual </a:t>
+            </a:r>
+            <a:r>
+              <a:rPr lang="en-US" sz="3168" dirty="0" smtClean="0"/>
+              <a:t>Projects</a:t>
+            </a:r>
+            <a:endParaRPr sz="3168" dirty="0"/>
+          </a:p>
+          <a:p>
+            <a:pPr marL="391159" lvl="0" indent="-391159" defTabSz="514095">
+              <a:spcBef>
+                <a:spcPts val="3600"/>
+              </a:spcBef>
+              <a:defRPr sz="1800"/>
+            </a:pPr>
+            <a:r>
+              <a:rPr sz="3168" dirty="0"/>
+              <a:t>Learn </a:t>
+            </a:r>
+            <a:r>
+              <a:rPr sz="3168" dirty="0" smtClean="0"/>
+              <a:t>to</a:t>
+            </a:r>
+            <a:endParaRPr lang="en-US" sz="3168" dirty="0" smtClean="0"/>
+          </a:p>
+          <a:p>
+            <a:pPr marL="835659" lvl="1" indent="-391159" defTabSz="514095">
+              <a:spcBef>
+                <a:spcPts val="3600"/>
+              </a:spcBef>
+              <a:defRPr sz="1800"/>
+            </a:pPr>
+            <a:r>
+              <a:rPr lang="en-US" sz="3168" dirty="0" smtClean="0"/>
+              <a:t>Setup and Customize </a:t>
+            </a:r>
+            <a:r>
+              <a:rPr lang="en-US" sz="3168" dirty="0" err="1" smtClean="0"/>
+              <a:t>RStudio</a:t>
+            </a:r>
+            <a:endParaRPr lang="en-US" sz="3168" dirty="0" smtClean="0"/>
+          </a:p>
+          <a:p>
+            <a:pPr marL="835659" lvl="1" indent="-391159" defTabSz="514095">
+              <a:spcBef>
+                <a:spcPts val="3600"/>
+              </a:spcBef>
+              <a:defRPr sz="1800"/>
+            </a:pPr>
+            <a:r>
+              <a:rPr lang="en-US" sz="3168" dirty="0" smtClean="0"/>
+              <a:t>Work </a:t>
+            </a:r>
+            <a:r>
+              <a:rPr lang="en-US" sz="3168" dirty="0"/>
+              <a:t>with R packages</a:t>
+            </a:r>
+          </a:p>
+          <a:p>
+            <a:pPr marL="835659" lvl="1" indent="-391159" defTabSz="514095">
+              <a:spcBef>
+                <a:spcPts val="3600"/>
+              </a:spcBef>
+              <a:defRPr sz="1800"/>
+            </a:pPr>
+            <a:r>
+              <a:rPr lang="en-US" sz="3168" dirty="0" smtClean="0"/>
+              <a:t>Import data into R</a:t>
+            </a:r>
+          </a:p>
+          <a:p>
+            <a:pPr marL="835659" lvl="1" indent="-391159" defTabSz="514095">
+              <a:spcBef>
+                <a:spcPts val="3600"/>
+              </a:spcBef>
+              <a:defRPr sz="1800"/>
+            </a:pPr>
+            <a:r>
+              <a:rPr lang="en-US" sz="3168" dirty="0" smtClean="0"/>
+              <a:t>R data structures – vectors, matrices, </a:t>
+            </a:r>
+            <a:r>
+              <a:rPr lang="en-US" sz="3168" dirty="0" err="1" smtClean="0"/>
+              <a:t>dataframes</a:t>
+            </a:r>
+            <a:r>
+              <a:rPr lang="en-US" sz="3168" dirty="0" smtClean="0"/>
+              <a:t>, lists</a:t>
+            </a:r>
+          </a:p>
+          <a:p>
+            <a:pPr marL="835659" lvl="1" indent="-391159" defTabSz="514095">
+              <a:spcBef>
+                <a:spcPts val="3600"/>
+              </a:spcBef>
+              <a:defRPr sz="1800"/>
+            </a:pPr>
+            <a:r>
+              <a:rPr lang="en-US" sz="3168" dirty="0" smtClean="0"/>
+              <a:t>R control structures – loops, apply functions</a:t>
+            </a:r>
+          </a:p>
+          <a:p>
+            <a:pPr marL="835659" lvl="1" indent="-391159" defTabSz="514095">
+              <a:spcBef>
+                <a:spcPts val="3600"/>
+              </a:spcBef>
+              <a:defRPr sz="1800"/>
+            </a:pPr>
+            <a:r>
+              <a:rPr lang="en-US" sz="3168" dirty="0" smtClean="0"/>
+              <a:t>R graphics</a:t>
+            </a:r>
           </a:p>
         </p:txBody>
       </p:sp>
     </p:spTree>
-    <p:extLst>
-      <p:ext uri="{BB962C8B-B14F-4D97-AF65-F5344CB8AC3E}">
-        <p14:creationId xmlns:p14="http://schemas.microsoft.com/office/powerpoint/2010/main" val="9030025"/>
-      </p:ext>
-    </p:extLst>
   </p:cSld>
   <p:clrMapOvr>
     <a:masterClrMapping/>
@@ -2797,247 +2833,6 @@
       </p:grpSpPr>
       <p:sp>
         <p:nvSpPr>
-          <p:cNvPr id="36" name="Shape 36"/>
-          <p:cNvSpPr>
-            <a:spLocks noGrp="1"/>
-          </p:cNvSpPr>
-          <p:nvPr>
-            <p:ph type="title"/>
-          </p:nvPr>
-        </p:nvSpPr>
-        <p:spPr>
-          <a:prstGeom prst="rect">
-            <a:avLst/>
-          </a:prstGeom>
-        </p:spPr>
-        <p:txBody>
-          <a:bodyPr/>
-          <a:lstStyle/>
-          <a:p>
-            <a:pPr lvl="0">
-              <a:defRPr sz="1800"/>
-            </a:pPr>
-            <a:r>
-              <a:rPr sz="8000"/>
-              <a:t>Workshop Objectives</a:t>
-            </a:r>
-          </a:p>
-        </p:txBody>
-      </p:sp>
-      <p:sp>
-        <p:nvSpPr>
-          <p:cNvPr id="37" name="Shape 37"/>
-          <p:cNvSpPr>
-            <a:spLocks noGrp="1"/>
-          </p:cNvSpPr>
-          <p:nvPr>
-            <p:ph type="body" idx="4294967295"/>
-          </p:nvPr>
-        </p:nvSpPr>
-        <p:spPr>
-          <a:prstGeom prst="rect">
-            <a:avLst/>
-          </a:prstGeom>
-        </p:spPr>
-        <p:txBody>
-          <a:bodyPr>
-            <a:normAutofit fontScale="55000" lnSpcReduction="20000"/>
-          </a:bodyPr>
-          <a:lstStyle/>
-          <a:p>
-            <a:pPr marL="391159" lvl="0" indent="-391159" defTabSz="514095">
-              <a:spcBef>
-                <a:spcPts val="3600"/>
-              </a:spcBef>
-              <a:defRPr sz="1800"/>
-            </a:pPr>
-            <a:r>
-              <a:rPr sz="3168" dirty="0"/>
-              <a:t>Get Comfortable with R</a:t>
-            </a:r>
-          </a:p>
-          <a:p>
-            <a:pPr marL="782319" lvl="1" indent="-391159" defTabSz="514095">
-              <a:spcBef>
-                <a:spcPts val="3600"/>
-              </a:spcBef>
-              <a:defRPr sz="1800"/>
-            </a:pPr>
-            <a:r>
-              <a:rPr sz="3168" dirty="0"/>
-              <a:t>For Your Classes</a:t>
-            </a:r>
-          </a:p>
-          <a:p>
-            <a:pPr marL="782319" lvl="1" indent="-391159" defTabSz="514095">
-              <a:spcBef>
-                <a:spcPts val="3600"/>
-              </a:spcBef>
-              <a:defRPr sz="1800"/>
-            </a:pPr>
-            <a:r>
-              <a:rPr sz="3168" dirty="0"/>
-              <a:t>Individual </a:t>
-            </a:r>
-            <a:r>
-              <a:rPr lang="en-US" sz="3168" dirty="0" smtClean="0"/>
-              <a:t>Projects</a:t>
-            </a:r>
-            <a:endParaRPr sz="3168" dirty="0"/>
-          </a:p>
-          <a:p>
-            <a:pPr marL="391159" lvl="0" indent="-391159" defTabSz="514095">
-              <a:spcBef>
-                <a:spcPts val="3600"/>
-              </a:spcBef>
-              <a:defRPr sz="1800"/>
-            </a:pPr>
-            <a:r>
-              <a:rPr sz="3168" dirty="0"/>
-              <a:t>Learn </a:t>
-            </a:r>
-            <a:r>
-              <a:rPr sz="3168" dirty="0" smtClean="0"/>
-              <a:t>to</a:t>
-            </a:r>
-            <a:endParaRPr lang="en-US" sz="3168" dirty="0" smtClean="0"/>
-          </a:p>
-          <a:p>
-            <a:pPr marL="835659" lvl="1" indent="-391159" defTabSz="514095">
-              <a:spcBef>
-                <a:spcPts val="3600"/>
-              </a:spcBef>
-              <a:defRPr sz="1800"/>
-            </a:pPr>
-            <a:r>
-              <a:rPr lang="en-US" sz="3168" dirty="0" smtClean="0"/>
-              <a:t>Setup </a:t>
-            </a:r>
-            <a:r>
-              <a:rPr lang="en-US" sz="3168" dirty="0" smtClean="0"/>
-              <a:t>and Customize </a:t>
-            </a:r>
-            <a:r>
-              <a:rPr lang="en-US" sz="3168" dirty="0" err="1" smtClean="0"/>
-              <a:t>RStudio</a:t>
-            </a:r>
-            <a:endParaRPr lang="en-US" sz="3168" dirty="0" smtClean="0"/>
-          </a:p>
-          <a:p>
-            <a:pPr marL="835659" lvl="1" indent="-391159" defTabSz="514095">
-              <a:spcBef>
-                <a:spcPts val="3600"/>
-              </a:spcBef>
-              <a:defRPr sz="1800"/>
-            </a:pPr>
-            <a:r>
-              <a:rPr lang="en-US" sz="3168" dirty="0" smtClean="0"/>
-              <a:t>Work </a:t>
-            </a:r>
-            <a:r>
-              <a:rPr lang="en-US" sz="3168" dirty="0"/>
-              <a:t>with R packages</a:t>
-            </a:r>
-          </a:p>
-          <a:p>
-            <a:pPr marL="835659" lvl="1" indent="-391159" defTabSz="514095">
-              <a:spcBef>
-                <a:spcPts val="3600"/>
-              </a:spcBef>
-              <a:defRPr sz="1800"/>
-            </a:pPr>
-            <a:r>
-              <a:rPr lang="en-US" sz="3168" dirty="0" smtClean="0"/>
-              <a:t>Import data into R</a:t>
-            </a:r>
-            <a:endParaRPr lang="en-US" sz="3168" dirty="0" smtClean="0"/>
-          </a:p>
-          <a:p>
-            <a:pPr marL="835659" lvl="1" indent="-391159" defTabSz="514095">
-              <a:spcBef>
-                <a:spcPts val="3600"/>
-              </a:spcBef>
-              <a:defRPr sz="1800"/>
-            </a:pPr>
-            <a:r>
-              <a:rPr lang="en-US" sz="3168" dirty="0" smtClean="0"/>
-              <a:t>R data structures – vectors, matrices, </a:t>
-            </a:r>
-            <a:r>
-              <a:rPr lang="en-US" sz="3168" dirty="0" err="1" smtClean="0"/>
-              <a:t>dataframes</a:t>
-            </a:r>
-            <a:r>
-              <a:rPr lang="en-US" sz="3168" dirty="0" smtClean="0"/>
-              <a:t>, lists</a:t>
-            </a:r>
-          </a:p>
-          <a:p>
-            <a:pPr marL="835659" lvl="1" indent="-391159" defTabSz="514095">
-              <a:spcBef>
-                <a:spcPts val="3600"/>
-              </a:spcBef>
-              <a:defRPr sz="1800"/>
-            </a:pPr>
-            <a:r>
-              <a:rPr lang="en-US" sz="3168" dirty="0" smtClean="0"/>
-              <a:t>R control structures – loops, apply functions</a:t>
-            </a:r>
-          </a:p>
-          <a:p>
-            <a:pPr marL="835659" lvl="1" indent="-391159" defTabSz="514095">
-              <a:spcBef>
-                <a:spcPts val="3600"/>
-              </a:spcBef>
-              <a:defRPr sz="1800"/>
-            </a:pPr>
-            <a:r>
-              <a:rPr lang="en-US" sz="3168" dirty="0" smtClean="0"/>
-              <a:t>R </a:t>
-            </a:r>
-            <a:r>
-              <a:rPr lang="en-US" sz="3168" dirty="0" smtClean="0"/>
-              <a:t>graphics</a:t>
-            </a:r>
-            <a:endParaRPr lang="en-US" sz="3168" dirty="0" smtClean="0"/>
-          </a:p>
-        </p:txBody>
-      </p:sp>
-    </p:spTree>
-  </p:cSld>
-  <p:clrMapOvr>
-    <a:masterClrMapping/>
-  </p:clrMapOvr>
-  <p:transition spd="med"/>
-  <p:timing>
-    <p:tnLst>
-      <p:par>
-        <p:cTn id="1" dur="indefinite" restart="never" nodeType="tmRoot"/>
-      </p:par>
-    </p:tnLst>
-  </p:timing>
-</p:sld>
-</file>
-
-<file path=ppt/slides/slide4.xml><?xml version="1.0" encoding="utf-8"?>
-<p:sld xmlns:a="http://schemas.openxmlformats.org/drawingml/2006/main" xmlns:r="http://schemas.openxmlformats.org/officeDocument/2006/relationships" xmlns:p="http://schemas.openxmlformats.org/presentationml/2006/main">
-  <p:cSld>
-    <p:spTree>
-      <p:nvGrpSpPr>
-        <p:cNvPr id="1" name=""/>
-        <p:cNvGrpSpPr/>
-        <p:nvPr/>
-      </p:nvGrpSpPr>
-      <p:grpSpPr>
-        <a:xfrm>
-          <a:off x="0" y="0"/>
-          <a:ext cx="0" cy="0"/>
-          <a:chOff x="0" y="0"/>
-          <a:chExt cx="0" cy="0"/>
-        </a:xfrm>
-      </p:grpSpPr>
-      <p:sp>
-        <p:nvSpPr>
           <p:cNvPr id="2" name="Title 1"/>
           <p:cNvSpPr>
             <a:spLocks noGrp="1"/>
@@ -3155,7 +2950,7 @@
 </p:sld>
 </file>
 
-<file path=ppt/slides/slide5.xml><?xml version="1.0" encoding="utf-8"?>
+<file path=ppt/slides/slide4.xml><?xml version="1.0" encoding="utf-8"?>
 <p:sld xmlns:a="http://schemas.openxmlformats.org/drawingml/2006/main" xmlns:r="http://schemas.openxmlformats.org/officeDocument/2006/relationships" xmlns:p="http://schemas.openxmlformats.org/presentationml/2006/main">
   <p:cSld>
     <p:spTree>
@@ -3261,7 +3056,7 @@
 </p:sld>
 </file>
 
-<file path=ppt/slides/slide6.xml><?xml version="1.0" encoding="utf-8"?>
+<file path=ppt/slides/slide5.xml><?xml version="1.0" encoding="utf-8"?>
 <p:sld xmlns:a="http://schemas.openxmlformats.org/drawingml/2006/main" xmlns:r="http://schemas.openxmlformats.org/officeDocument/2006/relationships" xmlns:p="http://schemas.openxmlformats.org/presentationml/2006/main">
   <p:cSld>
     <p:spTree>
@@ -4837,7 +4632,7 @@
 </p:sld>
 </file>
 
-<file path=ppt/slides/slide7.xml><?xml version="1.0" encoding="utf-8"?>
+<file path=ppt/slides/slide6.xml><?xml version="1.0" encoding="utf-8"?>
 <p:sld xmlns:a="http://schemas.openxmlformats.org/drawingml/2006/main" xmlns:r="http://schemas.openxmlformats.org/officeDocument/2006/relationships" xmlns:p="http://schemas.openxmlformats.org/presentationml/2006/main">
   <p:cSld>
     <p:spTree>
@@ -4900,7 +4695,7 @@
 </p:sld>
 </file>
 
-<file path=ppt/slides/slide8.xml><?xml version="1.0" encoding="utf-8"?>
+<file path=ppt/slides/slide7.xml><?xml version="1.0" encoding="utf-8"?>
 <p:sld xmlns:a="http://schemas.openxmlformats.org/drawingml/2006/main" xmlns:r="http://schemas.openxmlformats.org/officeDocument/2006/relationships" xmlns:p="http://schemas.openxmlformats.org/presentationml/2006/main">
   <p:cSld>
     <p:spTree>
@@ -4955,6 +4750,141 @@
     <p:extLst>
       <p:ext uri="{BB962C8B-B14F-4D97-AF65-F5344CB8AC3E}">
         <p14:creationId xmlns:p14="http://schemas.microsoft.com/office/powerpoint/2010/main" val="649341038"/>
+      </p:ext>
+    </p:extLst>
+  </p:cSld>
+  <p:clrMapOvr>
+    <a:masterClrMapping/>
+  </p:clrMapOvr>
+  <p:transition spd="med"/>
+  <p:timing>
+    <p:tnLst>
+      <p:par>
+        <p:cTn id="1" dur="indefinite" restart="never" nodeType="tmRoot"/>
+      </p:par>
+    </p:tnLst>
+  </p:timing>
+</p:sld>
+</file>
+
+<file path=ppt/slides/slide8.xml><?xml version="1.0" encoding="utf-8"?>
+<p:sld xmlns:a="http://schemas.openxmlformats.org/drawingml/2006/main" xmlns:r="http://schemas.openxmlformats.org/officeDocument/2006/relationships" xmlns:p="http://schemas.openxmlformats.org/presentationml/2006/main">
+  <p:cSld>
+    <p:spTree>
+      <p:nvGrpSpPr>
+        <p:cNvPr id="1" name=""/>
+        <p:cNvGrpSpPr/>
+        <p:nvPr/>
+      </p:nvGrpSpPr>
+      <p:grpSpPr>
+        <a:xfrm>
+          <a:off x="0" y="0"/>
+          <a:ext cx="0" cy="0"/>
+          <a:chOff x="0" y="0"/>
+          <a:chExt cx="0" cy="0"/>
+        </a:xfrm>
+      </p:grpSpPr>
+      <p:sp>
+        <p:nvSpPr>
+          <p:cNvPr id="2" name="Title 1"/>
+          <p:cNvSpPr>
+            <a:spLocks noGrp="1"/>
+          </p:cNvSpPr>
+          <p:nvPr>
+            <p:ph type="title"/>
+          </p:nvPr>
+        </p:nvSpPr>
+        <p:spPr/>
+        <p:txBody>
+          <a:bodyPr>
+            <a:normAutofit fontScale="90000"/>
+          </a:bodyPr>
+          <a:lstStyle/>
+          <a:p>
+            <a:r>
+              <a:rPr lang="en-US" dirty="0" smtClean="0"/>
+              <a:t>Installing Packages from CRAN</a:t>
+            </a:r>
+            <a:endParaRPr lang="en-US" dirty="0"/>
+          </a:p>
+        </p:txBody>
+      </p:sp>
+      <p:sp>
+        <p:nvSpPr>
+          <p:cNvPr id="3" name="Text Placeholder 2"/>
+          <p:cNvSpPr>
+            <a:spLocks noGrp="1"/>
+          </p:cNvSpPr>
+          <p:nvPr>
+            <p:ph type="body" idx="1"/>
+          </p:nvPr>
+        </p:nvSpPr>
+        <p:spPr/>
+        <p:txBody>
+          <a:bodyPr>
+            <a:normAutofit/>
+          </a:bodyPr>
+          <a:lstStyle/>
+          <a:p>
+            <a:r>
+              <a:rPr lang="en-US" dirty="0" smtClean="0"/>
+              <a:t>Installing</a:t>
+            </a:r>
+          </a:p>
+          <a:p>
+            <a:pPr marL="0" indent="0">
+              <a:buNone/>
+            </a:pPr>
+            <a:r>
+              <a:rPr lang="en-US" b="1" dirty="0" smtClean="0"/>
+              <a:t>&gt; </a:t>
+            </a:r>
+            <a:r>
+              <a:rPr lang="en-US" b="1" dirty="0" err="1" smtClean="0"/>
+              <a:t>install.packages</a:t>
+            </a:r>
+            <a:r>
+              <a:rPr lang="en-US" b="1" dirty="0" smtClean="0"/>
+              <a:t>(“</a:t>
+            </a:r>
+            <a:r>
+              <a:rPr lang="en-US" b="1" dirty="0" err="1" smtClean="0"/>
+              <a:t>packagename</a:t>
+            </a:r>
+            <a:r>
+              <a:rPr lang="en-US" b="1" dirty="0" smtClean="0"/>
+              <a:t>”)</a:t>
+            </a:r>
+          </a:p>
+          <a:p>
+            <a:r>
+              <a:rPr lang="en-US" dirty="0" smtClean="0"/>
+              <a:t>Loading</a:t>
+            </a:r>
+          </a:p>
+          <a:p>
+            <a:pPr marL="0" indent="0">
+              <a:buNone/>
+            </a:pPr>
+            <a:r>
+              <a:rPr lang="en-US" b="1" dirty="0" smtClean="0"/>
+              <a:t>&gt; library(</a:t>
+            </a:r>
+            <a:r>
+              <a:rPr lang="en-US" b="1" dirty="0" err="1" smtClean="0"/>
+              <a:t>packagename</a:t>
+            </a:r>
+            <a:r>
+              <a:rPr lang="en-US" b="1" dirty="0" smtClean="0"/>
+              <a:t>)</a:t>
+            </a:r>
+          </a:p>
+        </p:txBody>
+      </p:sp>
+    </p:spTree>
+    <p:extLst>
+      <p:ext uri="{BB962C8B-B14F-4D97-AF65-F5344CB8AC3E}">
+        <p14:creationId xmlns:p14="http://schemas.microsoft.com/office/powerpoint/2010/main" val="1658951768"/>
       </p:ext>
     </p:extLst>
   </p:cSld>
@@ -5008,7 +4938,7 @@
           <a:p>
             <a:r>
               <a:rPr lang="en-US" dirty="0" smtClean="0"/>
-              <a:t>Installing Packages from CRAN</a:t>
+              <a:t>Installing Packages From CRAN</a:t>
             </a:r>
             <a:endParaRPr lang="en-US" dirty="0"/>
           </a:p>
@@ -5032,64 +4962,31 @@
           <a:lstStyle/>
           <a:p>
             <a:r>
-              <a:rPr lang="en-US" dirty="0" smtClean="0"/>
-              <a:t>Installing</a:t>
-            </a:r>
-          </a:p>
-          <a:p>
-            <a:pPr marL="0" indent="0">
-              <a:buNone/>
-            </a:pPr>
-            <a:r>
-              <a:rPr lang="en-US" b="1" dirty="0" smtClean="0"/>
-              <a:t>&gt; </a:t>
-            </a:r>
-            <a:r>
               <a:rPr lang="en-US" b="1" dirty="0" err="1" smtClean="0"/>
-              <a:t>install.packages</a:t>
-            </a:r>
-            <a:r>
-              <a:rPr lang="en-US" b="1" dirty="0" smtClean="0"/>
-              <a:t>(“</a:t>
-            </a:r>
+              <a:t>devtools</a:t>
+            </a:r>
+            <a:endParaRPr lang="en-US" b="1" dirty="0" smtClean="0"/>
+          </a:p>
+          <a:p>
             <a:r>
               <a:rPr lang="en-US" b="1" dirty="0" err="1" smtClean="0"/>
-              <a:t>packagename</a:t>
-            </a:r>
-            <a:r>
-              <a:rPr lang="en-US" b="1" dirty="0" smtClean="0"/>
-              <a:t>”)</a:t>
-            </a:r>
-          </a:p>
-          <a:p>
-            <a:r>
-              <a:rPr lang="en-US" dirty="0" smtClean="0"/>
-              <a:t>Loading</a:t>
-            </a:r>
-          </a:p>
-          <a:p>
-            <a:pPr marL="0" indent="0">
-              <a:buNone/>
-            </a:pPr>
-            <a:r>
-              <a:rPr lang="en-US" b="1" dirty="0" smtClean="0"/>
-              <a:t>&gt; library(</a:t>
-            </a:r>
+              <a:t>rmarkdown</a:t>
+            </a:r>
+            <a:endParaRPr lang="en-US" b="1" dirty="0" smtClean="0"/>
+          </a:p>
+          <a:p>
             <a:r>
               <a:rPr lang="en-US" b="1" dirty="0" err="1" smtClean="0"/>
-              <a:t>packagename</a:t>
-            </a:r>
-            <a:r>
-              <a:rPr lang="en-US" b="1" dirty="0" smtClean="0"/>
-              <a:t>)</a:t>
-            </a:r>
+              <a:t>knitr</a:t>
+            </a:r>
+            <a:endParaRPr lang="en-US" b="1" dirty="0" smtClean="0"/>
           </a:p>
         </p:txBody>
       </p:sp>
     </p:spTree>
     <p:extLst>
       <p:ext uri="{BB962C8B-B14F-4D97-AF65-F5344CB8AC3E}">
-        <p14:creationId xmlns:p14="http://schemas.microsoft.com/office/powerpoint/2010/main" val="1658951768"/>
+        <p14:creationId xmlns:p14="http://schemas.microsoft.com/office/powerpoint/2010/main" val="2321929056"/>
       </p:ext>
     </p:extLst>
   </p:cSld>

</xml_diff>